<commit_message>
login & loginform 구현
</commit_message>
<xml_diff>
--- a/images/vue(office).pptx
+++ b/images/vue(office).pptx
@@ -273,7 +273,7 @@
           <a:p>
             <a:fld id="{D669FA1A-B387-4C47-9841-2D1A9ED4BFE2}" type="datetimeFigureOut">
               <a:rPr lang="ko-KR" altLang="en-US" smtClean="0"/>
-              <a:t>2021-11-02</a:t>
+              <a:t>2021-11-03</a:t>
             </a:fld>
             <a:endParaRPr lang="ko-KR" altLang="en-US"/>
           </a:p>
@@ -443,7 +443,7 @@
           <a:p>
             <a:fld id="{D669FA1A-B387-4C47-9841-2D1A9ED4BFE2}" type="datetimeFigureOut">
               <a:rPr lang="ko-KR" altLang="en-US" smtClean="0"/>
-              <a:t>2021-11-02</a:t>
+              <a:t>2021-11-03</a:t>
             </a:fld>
             <a:endParaRPr lang="ko-KR" altLang="en-US"/>
           </a:p>
@@ -623,7 +623,7 @@
           <a:p>
             <a:fld id="{D669FA1A-B387-4C47-9841-2D1A9ED4BFE2}" type="datetimeFigureOut">
               <a:rPr lang="ko-KR" altLang="en-US" smtClean="0"/>
-              <a:t>2021-11-02</a:t>
+              <a:t>2021-11-03</a:t>
             </a:fld>
             <a:endParaRPr lang="ko-KR" altLang="en-US"/>
           </a:p>
@@ -793,7 +793,7 @@
           <a:p>
             <a:fld id="{D669FA1A-B387-4C47-9841-2D1A9ED4BFE2}" type="datetimeFigureOut">
               <a:rPr lang="ko-KR" altLang="en-US" smtClean="0"/>
-              <a:t>2021-11-02</a:t>
+              <a:t>2021-11-03</a:t>
             </a:fld>
             <a:endParaRPr lang="ko-KR" altLang="en-US"/>
           </a:p>
@@ -1039,7 +1039,7 @@
           <a:p>
             <a:fld id="{D669FA1A-B387-4C47-9841-2D1A9ED4BFE2}" type="datetimeFigureOut">
               <a:rPr lang="ko-KR" altLang="en-US" smtClean="0"/>
-              <a:t>2021-11-02</a:t>
+              <a:t>2021-11-03</a:t>
             </a:fld>
             <a:endParaRPr lang="ko-KR" altLang="en-US"/>
           </a:p>
@@ -1271,7 +1271,7 @@
           <a:p>
             <a:fld id="{D669FA1A-B387-4C47-9841-2D1A9ED4BFE2}" type="datetimeFigureOut">
               <a:rPr lang="ko-KR" altLang="en-US" smtClean="0"/>
-              <a:t>2021-11-02</a:t>
+              <a:t>2021-11-03</a:t>
             </a:fld>
             <a:endParaRPr lang="ko-KR" altLang="en-US"/>
           </a:p>
@@ -1638,7 +1638,7 @@
           <a:p>
             <a:fld id="{D669FA1A-B387-4C47-9841-2D1A9ED4BFE2}" type="datetimeFigureOut">
               <a:rPr lang="ko-KR" altLang="en-US" smtClean="0"/>
-              <a:t>2021-11-02</a:t>
+              <a:t>2021-11-03</a:t>
             </a:fld>
             <a:endParaRPr lang="ko-KR" altLang="en-US"/>
           </a:p>
@@ -1756,7 +1756,7 @@
           <a:p>
             <a:fld id="{D669FA1A-B387-4C47-9841-2D1A9ED4BFE2}" type="datetimeFigureOut">
               <a:rPr lang="ko-KR" altLang="en-US" smtClean="0"/>
-              <a:t>2021-11-02</a:t>
+              <a:t>2021-11-03</a:t>
             </a:fld>
             <a:endParaRPr lang="ko-KR" altLang="en-US"/>
           </a:p>
@@ -1851,7 +1851,7 @@
           <a:p>
             <a:fld id="{D669FA1A-B387-4C47-9841-2D1A9ED4BFE2}" type="datetimeFigureOut">
               <a:rPr lang="ko-KR" altLang="en-US" smtClean="0"/>
-              <a:t>2021-11-02</a:t>
+              <a:t>2021-11-03</a:t>
             </a:fld>
             <a:endParaRPr lang="ko-KR" altLang="en-US"/>
           </a:p>
@@ -2128,7 +2128,7 @@
           <a:p>
             <a:fld id="{D669FA1A-B387-4C47-9841-2D1A9ED4BFE2}" type="datetimeFigureOut">
               <a:rPr lang="ko-KR" altLang="en-US" smtClean="0"/>
-              <a:t>2021-11-02</a:t>
+              <a:t>2021-11-03</a:t>
             </a:fld>
             <a:endParaRPr lang="ko-KR" altLang="en-US"/>
           </a:p>
@@ -2381,7 +2381,7 @@
           <a:p>
             <a:fld id="{D669FA1A-B387-4C47-9841-2D1A9ED4BFE2}" type="datetimeFigureOut">
               <a:rPr lang="ko-KR" altLang="en-US" smtClean="0"/>
-              <a:t>2021-11-02</a:t>
+              <a:t>2021-11-03</a:t>
             </a:fld>
             <a:endParaRPr lang="ko-KR" altLang="en-US"/>
           </a:p>
@@ -2594,7 +2594,7 @@
           <a:p>
             <a:fld id="{D669FA1A-B387-4C47-9841-2D1A9ED4BFE2}" type="datetimeFigureOut">
               <a:rPr lang="ko-KR" altLang="en-US" smtClean="0"/>
-              <a:t>2021-11-02</a:t>
+              <a:t>2021-11-03</a:t>
             </a:fld>
             <a:endParaRPr lang="ko-KR" altLang="en-US"/>
           </a:p>
@@ -13071,6 +13071,724 @@
           </a:p>
         </p:txBody>
       </p:sp>
+      <p:sp>
+        <p:nvSpPr>
+          <p:cNvPr id="27" name="모서리가 둥근 직사각형 26"/>
+          <p:cNvSpPr/>
+          <p:nvPr/>
+        </p:nvSpPr>
+        <p:spPr>
+          <a:xfrm>
+            <a:off x="278215" y="3703132"/>
+            <a:ext cx="4480822" cy="2271641"/>
+          </a:xfrm>
+          <a:prstGeom prst="roundRect">
+            <a:avLst>
+              <a:gd name="adj" fmla="val 1880"/>
+            </a:avLst>
+          </a:prstGeom>
+          <a:solidFill>
+            <a:schemeClr val="bg1">
+              <a:lumMod val="85000"/>
+            </a:schemeClr>
+          </a:solidFill>
+          <a:ln>
+            <a:solidFill>
+              <a:schemeClr val="tx1"/>
+            </a:solidFill>
+          </a:ln>
+        </p:spPr>
+        <p:style>
+          <a:lnRef idx="2">
+            <a:schemeClr val="accent1">
+              <a:shade val="50000"/>
+            </a:schemeClr>
+          </a:lnRef>
+          <a:fillRef idx="1">
+            <a:schemeClr val="accent1"/>
+          </a:fillRef>
+          <a:effectRef idx="0">
+            <a:schemeClr val="accent1"/>
+          </a:effectRef>
+          <a:fontRef idx="minor">
+            <a:schemeClr val="lt1"/>
+          </a:fontRef>
+        </p:style>
+        <p:txBody>
+          <a:bodyPr rtlCol="0" anchor="ctr"/>
+          <a:lstStyle/>
+          <a:p>
+            <a:pPr algn="ctr"/>
+            <a:endParaRPr lang="ko-KR" altLang="en-US" dirty="0"/>
+          </a:p>
+        </p:txBody>
+      </p:sp>
+      <p:sp>
+        <p:nvSpPr>
+          <p:cNvPr id="28" name="모서리가 둥근 직사각형 27"/>
+          <p:cNvSpPr/>
+          <p:nvPr/>
+        </p:nvSpPr>
+        <p:spPr>
+          <a:xfrm>
+            <a:off x="3657115" y="4039064"/>
+            <a:ext cx="987879" cy="656461"/>
+          </a:xfrm>
+          <a:prstGeom prst="roundRect">
+            <a:avLst/>
+          </a:prstGeom>
+          <a:solidFill>
+            <a:schemeClr val="accent6">
+              <a:lumMod val="40000"/>
+              <a:lumOff val="60000"/>
+            </a:schemeClr>
+          </a:solidFill>
+          <a:ln>
+            <a:solidFill>
+              <a:schemeClr val="accent6"/>
+            </a:solidFill>
+          </a:ln>
+        </p:spPr>
+        <p:style>
+          <a:lnRef idx="2">
+            <a:schemeClr val="accent1">
+              <a:shade val="50000"/>
+            </a:schemeClr>
+          </a:lnRef>
+          <a:fillRef idx="1">
+            <a:schemeClr val="accent1"/>
+          </a:fillRef>
+          <a:effectRef idx="0">
+            <a:schemeClr val="accent1"/>
+          </a:effectRef>
+          <a:fontRef idx="minor">
+            <a:schemeClr val="lt1"/>
+          </a:fontRef>
+        </p:style>
+        <p:txBody>
+          <a:bodyPr rtlCol="0" anchor="ctr"/>
+          <a:lstStyle/>
+          <a:p>
+            <a:pPr algn="ctr"/>
+            <a:r>
+              <a:rPr lang="en-US" altLang="ko-KR" dirty="0" smtClean="0">
+                <a:solidFill>
+                  <a:schemeClr val="tx1"/>
+                </a:solidFill>
+              </a:rPr>
+              <a:t>API</a:t>
+            </a:r>
+            <a:endParaRPr lang="ko-KR" altLang="en-US" dirty="0">
+              <a:solidFill>
+                <a:schemeClr val="tx1"/>
+              </a:solidFill>
+            </a:endParaRPr>
+          </a:p>
+        </p:txBody>
+      </p:sp>
+      <p:sp>
+        <p:nvSpPr>
+          <p:cNvPr id="30" name="순서도: 자기 디스크 29"/>
+          <p:cNvSpPr/>
+          <p:nvPr/>
+        </p:nvSpPr>
+        <p:spPr>
+          <a:xfrm>
+            <a:off x="3740613" y="4871178"/>
+            <a:ext cx="820882" cy="946004"/>
+          </a:xfrm>
+          <a:prstGeom prst="flowChartMagneticDisk">
+            <a:avLst/>
+          </a:prstGeom>
+          <a:solidFill>
+            <a:schemeClr val="accent5">
+              <a:lumMod val="20000"/>
+              <a:lumOff val="80000"/>
+            </a:schemeClr>
+          </a:solidFill>
+        </p:spPr>
+        <p:style>
+          <a:lnRef idx="2">
+            <a:schemeClr val="accent1">
+              <a:shade val="50000"/>
+            </a:schemeClr>
+          </a:lnRef>
+          <a:fillRef idx="1">
+            <a:schemeClr val="accent1"/>
+          </a:fillRef>
+          <a:effectRef idx="0">
+            <a:schemeClr val="accent1"/>
+          </a:effectRef>
+          <a:fontRef idx="minor">
+            <a:schemeClr val="lt1"/>
+          </a:fontRef>
+        </p:style>
+        <p:txBody>
+          <a:bodyPr rtlCol="0" anchor="ctr"/>
+          <a:lstStyle/>
+          <a:p>
+            <a:pPr algn="ctr"/>
+            <a:r>
+              <a:rPr lang="en-US" altLang="ko-KR" sz="1000" dirty="0" smtClean="0">
+                <a:solidFill>
+                  <a:schemeClr val="tx1"/>
+                </a:solidFill>
+              </a:rPr>
+              <a:t>MongoDB</a:t>
+            </a:r>
+          </a:p>
+          <a:p>
+            <a:pPr algn="ctr"/>
+            <a:r>
+              <a:rPr lang="en-US" altLang="ko-KR" sz="1000" dirty="0" smtClean="0">
+                <a:solidFill>
+                  <a:schemeClr val="tx1"/>
+                </a:solidFill>
+              </a:rPr>
+              <a:t>(Cloud)</a:t>
+            </a:r>
+            <a:endParaRPr lang="ko-KR" altLang="en-US" sz="1000" dirty="0">
+              <a:solidFill>
+                <a:schemeClr val="tx1"/>
+              </a:solidFill>
+            </a:endParaRPr>
+          </a:p>
+        </p:txBody>
+      </p:sp>
+      <p:sp>
+        <p:nvSpPr>
+          <p:cNvPr id="31" name="모서리가 둥근 직사각형 30"/>
+          <p:cNvSpPr/>
+          <p:nvPr/>
+        </p:nvSpPr>
+        <p:spPr>
+          <a:xfrm>
+            <a:off x="379911" y="4039064"/>
+            <a:ext cx="1349829" cy="1778118"/>
+          </a:xfrm>
+          <a:prstGeom prst="roundRect">
+            <a:avLst/>
+          </a:prstGeom>
+          <a:solidFill>
+            <a:schemeClr val="accent4">
+              <a:lumMod val="40000"/>
+              <a:lumOff val="60000"/>
+            </a:schemeClr>
+          </a:solidFill>
+          <a:ln>
+            <a:solidFill>
+              <a:schemeClr val="accent4"/>
+            </a:solidFill>
+          </a:ln>
+        </p:spPr>
+        <p:style>
+          <a:lnRef idx="2">
+            <a:schemeClr val="accent1">
+              <a:shade val="50000"/>
+            </a:schemeClr>
+          </a:lnRef>
+          <a:fillRef idx="1">
+            <a:schemeClr val="accent1"/>
+          </a:fillRef>
+          <a:effectRef idx="0">
+            <a:schemeClr val="accent1"/>
+          </a:effectRef>
+          <a:fontRef idx="minor">
+            <a:schemeClr val="lt1"/>
+          </a:fontRef>
+        </p:style>
+        <p:txBody>
+          <a:bodyPr rtlCol="0" anchor="ctr"/>
+          <a:lstStyle/>
+          <a:p>
+            <a:r>
+              <a:rPr lang="en-US" altLang="ko-KR" sz="1000" dirty="0" smtClean="0">
+                <a:solidFill>
+                  <a:schemeClr val="tx1"/>
+                </a:solidFill>
+              </a:rPr>
+              <a:t>App</a:t>
+            </a:r>
+            <a:endParaRPr lang="ko-KR" altLang="en-US" sz="1000" dirty="0">
+              <a:solidFill>
+                <a:schemeClr val="tx1"/>
+              </a:solidFill>
+            </a:endParaRPr>
+          </a:p>
+        </p:txBody>
+      </p:sp>
+      <p:sp>
+        <p:nvSpPr>
+          <p:cNvPr id="32" name="모서리가 둥근 직사각형 31"/>
+          <p:cNvSpPr/>
+          <p:nvPr/>
+        </p:nvSpPr>
+        <p:spPr>
+          <a:xfrm>
+            <a:off x="976745" y="4208320"/>
+            <a:ext cx="1349829" cy="1054526"/>
+          </a:xfrm>
+          <a:prstGeom prst="roundRect">
+            <a:avLst/>
+          </a:prstGeom>
+          <a:solidFill>
+            <a:schemeClr val="accent1">
+              <a:lumMod val="40000"/>
+              <a:lumOff val="60000"/>
+            </a:schemeClr>
+          </a:solidFill>
+          <a:ln>
+            <a:solidFill>
+              <a:schemeClr val="accent1"/>
+            </a:solidFill>
+          </a:ln>
+        </p:spPr>
+        <p:style>
+          <a:lnRef idx="2">
+            <a:schemeClr val="accent1">
+              <a:shade val="50000"/>
+            </a:schemeClr>
+          </a:lnRef>
+          <a:fillRef idx="1">
+            <a:schemeClr val="accent1"/>
+          </a:fillRef>
+          <a:effectRef idx="0">
+            <a:schemeClr val="accent1"/>
+          </a:effectRef>
+          <a:fontRef idx="minor">
+            <a:schemeClr val="lt1"/>
+          </a:fontRef>
+        </p:style>
+        <p:txBody>
+          <a:bodyPr rtlCol="0" anchor="ctr"/>
+          <a:lstStyle/>
+          <a:p>
+            <a:r>
+              <a:rPr lang="en-US" altLang="ko-KR" sz="1000" dirty="0" err="1" smtClean="0">
+                <a:solidFill>
+                  <a:schemeClr val="tx1"/>
+                </a:solidFill>
+              </a:rPr>
+              <a:t>AppHeader</a:t>
+            </a:r>
+            <a:endParaRPr lang="ko-KR" altLang="en-US" sz="1000" dirty="0">
+              <a:solidFill>
+                <a:schemeClr val="tx1"/>
+              </a:solidFill>
+            </a:endParaRPr>
+          </a:p>
+        </p:txBody>
+      </p:sp>
+      <p:sp>
+        <p:nvSpPr>
+          <p:cNvPr id="33" name="모서리가 둥근 직사각형 32"/>
+          <p:cNvSpPr/>
+          <p:nvPr/>
+        </p:nvSpPr>
+        <p:spPr>
+          <a:xfrm>
+            <a:off x="976745" y="5335581"/>
+            <a:ext cx="1349829" cy="335001"/>
+          </a:xfrm>
+          <a:prstGeom prst="roundRect">
+            <a:avLst/>
+          </a:prstGeom>
+          <a:solidFill>
+            <a:schemeClr val="tx2">
+              <a:lumMod val="40000"/>
+              <a:lumOff val="60000"/>
+            </a:schemeClr>
+          </a:solidFill>
+          <a:ln>
+            <a:solidFill>
+              <a:schemeClr val="tx2"/>
+            </a:solidFill>
+          </a:ln>
+        </p:spPr>
+        <p:style>
+          <a:lnRef idx="2">
+            <a:schemeClr val="accent1">
+              <a:shade val="50000"/>
+            </a:schemeClr>
+          </a:lnRef>
+          <a:fillRef idx="1">
+            <a:schemeClr val="accent1"/>
+          </a:fillRef>
+          <a:effectRef idx="0">
+            <a:schemeClr val="accent1"/>
+          </a:effectRef>
+          <a:fontRef idx="minor">
+            <a:schemeClr val="lt1"/>
+          </a:fontRef>
+        </p:style>
+        <p:txBody>
+          <a:bodyPr rtlCol="0" anchor="ctr"/>
+          <a:lstStyle/>
+          <a:p>
+            <a:r>
+              <a:rPr lang="en-US" altLang="ko-KR" sz="1000" dirty="0" smtClean="0">
+                <a:solidFill>
+                  <a:schemeClr val="tx1"/>
+                </a:solidFill>
+              </a:rPr>
+              <a:t>Router View</a:t>
+            </a:r>
+            <a:endParaRPr lang="ko-KR" altLang="en-US" sz="1000" dirty="0">
+              <a:solidFill>
+                <a:schemeClr val="tx1"/>
+              </a:solidFill>
+            </a:endParaRPr>
+          </a:p>
+        </p:txBody>
+      </p:sp>
+      <p:sp>
+        <p:nvSpPr>
+          <p:cNvPr id="34" name="모서리가 둥근 직사각형 33"/>
+          <p:cNvSpPr/>
+          <p:nvPr/>
+        </p:nvSpPr>
+        <p:spPr>
+          <a:xfrm>
+            <a:off x="1860697" y="4294336"/>
+            <a:ext cx="1060798" cy="481442"/>
+          </a:xfrm>
+          <a:prstGeom prst="roundRect">
+            <a:avLst/>
+          </a:prstGeom>
+          <a:solidFill>
+            <a:schemeClr val="bg2">
+              <a:lumMod val="75000"/>
+            </a:schemeClr>
+          </a:solidFill>
+          <a:ln>
+            <a:solidFill>
+              <a:schemeClr val="bg2">
+                <a:lumMod val="50000"/>
+              </a:schemeClr>
+            </a:solidFill>
+          </a:ln>
+        </p:spPr>
+        <p:style>
+          <a:lnRef idx="2">
+            <a:schemeClr val="accent1">
+              <a:shade val="50000"/>
+            </a:schemeClr>
+          </a:lnRef>
+          <a:fillRef idx="1">
+            <a:schemeClr val="accent1"/>
+          </a:fillRef>
+          <a:effectRef idx="0">
+            <a:schemeClr val="accent1"/>
+          </a:effectRef>
+          <a:fontRef idx="minor">
+            <a:schemeClr val="lt1"/>
+          </a:fontRef>
+        </p:style>
+        <p:txBody>
+          <a:bodyPr rtlCol="0" anchor="ctr"/>
+          <a:lstStyle/>
+          <a:p>
+            <a:r>
+              <a:rPr lang="en-US" altLang="ko-KR" sz="1000" dirty="0" err="1" smtClean="0">
+                <a:solidFill>
+                  <a:schemeClr val="tx1"/>
+                </a:solidFill>
+              </a:rPr>
+              <a:t>LoginPage</a:t>
+            </a:r>
+            <a:endParaRPr lang="ko-KR" altLang="en-US" sz="1000" dirty="0">
+              <a:solidFill>
+                <a:schemeClr val="tx1"/>
+              </a:solidFill>
+            </a:endParaRPr>
+          </a:p>
+        </p:txBody>
+      </p:sp>
+      <p:sp>
+        <p:nvSpPr>
+          <p:cNvPr id="35" name="모서리가 둥근 직사각형 34"/>
+          <p:cNvSpPr/>
+          <p:nvPr/>
+        </p:nvSpPr>
+        <p:spPr>
+          <a:xfrm>
+            <a:off x="1862611" y="4871178"/>
+            <a:ext cx="1060798" cy="317803"/>
+          </a:xfrm>
+          <a:prstGeom prst="roundRect">
+            <a:avLst/>
+          </a:prstGeom>
+          <a:solidFill>
+            <a:schemeClr val="bg2">
+              <a:lumMod val="75000"/>
+            </a:schemeClr>
+          </a:solidFill>
+          <a:ln>
+            <a:solidFill>
+              <a:schemeClr val="bg2">
+                <a:lumMod val="50000"/>
+              </a:schemeClr>
+            </a:solidFill>
+          </a:ln>
+        </p:spPr>
+        <p:style>
+          <a:lnRef idx="2">
+            <a:schemeClr val="accent1">
+              <a:shade val="50000"/>
+            </a:schemeClr>
+          </a:lnRef>
+          <a:fillRef idx="1">
+            <a:schemeClr val="accent1"/>
+          </a:fillRef>
+          <a:effectRef idx="0">
+            <a:schemeClr val="accent1"/>
+          </a:effectRef>
+          <a:fontRef idx="minor">
+            <a:schemeClr val="lt1"/>
+          </a:fontRef>
+        </p:style>
+        <p:txBody>
+          <a:bodyPr rtlCol="0" anchor="ctr"/>
+          <a:lstStyle/>
+          <a:p>
+            <a:r>
+              <a:rPr lang="en-US" altLang="ko-KR" sz="1000" dirty="0" err="1" smtClean="0">
+                <a:solidFill>
+                  <a:schemeClr val="tx1"/>
+                </a:solidFill>
+              </a:rPr>
+              <a:t>SignupPage</a:t>
+            </a:r>
+            <a:endParaRPr lang="ko-KR" altLang="en-US" sz="1000" dirty="0">
+              <a:solidFill>
+                <a:schemeClr val="tx1"/>
+              </a:solidFill>
+            </a:endParaRPr>
+          </a:p>
+        </p:txBody>
+      </p:sp>
+      <p:sp>
+        <p:nvSpPr>
+          <p:cNvPr id="36" name="모서리가 둥근 직사각형 35"/>
+          <p:cNvSpPr/>
+          <p:nvPr/>
+        </p:nvSpPr>
+        <p:spPr>
+          <a:xfrm>
+            <a:off x="2625719" y="4387626"/>
+            <a:ext cx="853465" cy="294862"/>
+          </a:xfrm>
+          <a:prstGeom prst="roundRect">
+            <a:avLst/>
+          </a:prstGeom>
+          <a:solidFill>
+            <a:schemeClr val="accent6">
+              <a:lumMod val="20000"/>
+              <a:lumOff val="80000"/>
+            </a:schemeClr>
+          </a:solidFill>
+          <a:ln>
+            <a:solidFill>
+              <a:schemeClr val="accent6"/>
+            </a:solidFill>
+          </a:ln>
+        </p:spPr>
+        <p:style>
+          <a:lnRef idx="2">
+            <a:schemeClr val="accent1">
+              <a:shade val="50000"/>
+            </a:schemeClr>
+          </a:lnRef>
+          <a:fillRef idx="1">
+            <a:schemeClr val="accent1"/>
+          </a:fillRef>
+          <a:effectRef idx="0">
+            <a:schemeClr val="accent1"/>
+          </a:effectRef>
+          <a:fontRef idx="minor">
+            <a:schemeClr val="lt1"/>
+          </a:fontRef>
+        </p:style>
+        <p:txBody>
+          <a:bodyPr rtlCol="0" anchor="ctr"/>
+          <a:lstStyle/>
+          <a:p>
+            <a:r>
+              <a:rPr lang="en-US" altLang="ko-KR" sz="1000" dirty="0" err="1" smtClean="0">
+                <a:solidFill>
+                  <a:schemeClr val="tx1"/>
+                </a:solidFill>
+              </a:rPr>
+              <a:t>LoginForm</a:t>
+            </a:r>
+            <a:endParaRPr lang="ko-KR" altLang="en-US" sz="1000" dirty="0">
+              <a:solidFill>
+                <a:schemeClr val="tx1"/>
+              </a:solidFill>
+            </a:endParaRPr>
+          </a:p>
+        </p:txBody>
+      </p:sp>
+      <p:cxnSp>
+        <p:nvCxnSpPr>
+          <p:cNvPr id="37" name="구부러진 연결선 36"/>
+          <p:cNvCxnSpPr>
+            <a:stCxn id="36" idx="0"/>
+            <a:endCxn id="28" idx="0"/>
+          </p:cNvCxnSpPr>
+          <p:nvPr/>
+        </p:nvCxnSpPr>
+        <p:spPr>
+          <a:xfrm rot="5400000" flipH="1" flipV="1">
+            <a:off x="3427472" y="3664044"/>
+            <a:ext cx="348562" cy="1098603"/>
+          </a:xfrm>
+          <a:prstGeom prst="curvedConnector3">
+            <a:avLst>
+              <a:gd name="adj1" fmla="val 165584"/>
+            </a:avLst>
+          </a:prstGeom>
+          <a:ln>
+            <a:solidFill>
+              <a:srgbClr val="FF0000"/>
+            </a:solidFill>
+            <a:headEnd type="triangle" w="med" len="med"/>
+            <a:tailEnd type="triangle" w="med" len="med"/>
+          </a:ln>
+        </p:spPr>
+        <p:style>
+          <a:lnRef idx="1">
+            <a:schemeClr val="accent1"/>
+          </a:lnRef>
+          <a:fillRef idx="0">
+            <a:schemeClr val="accent1"/>
+          </a:fillRef>
+          <a:effectRef idx="0">
+            <a:schemeClr val="accent1"/>
+          </a:effectRef>
+          <a:fontRef idx="minor">
+            <a:schemeClr val="tx1"/>
+          </a:fontRef>
+        </p:style>
+      </p:cxnSp>
+      <p:cxnSp>
+        <p:nvCxnSpPr>
+          <p:cNvPr id="38" name="구부러진 연결선 37"/>
+          <p:cNvCxnSpPr>
+            <a:stCxn id="28" idx="2"/>
+            <a:endCxn id="30" idx="4"/>
+          </p:cNvCxnSpPr>
+          <p:nvPr/>
+        </p:nvCxnSpPr>
+        <p:spPr>
+          <a:xfrm rot="16200000" flipH="1">
+            <a:off x="4031948" y="4814632"/>
+            <a:ext cx="648655" cy="410440"/>
+          </a:xfrm>
+          <a:prstGeom prst="curvedConnector4">
+            <a:avLst>
+              <a:gd name="adj1" fmla="val 13540"/>
+              <a:gd name="adj2" fmla="val 176040"/>
+            </a:avLst>
+          </a:prstGeom>
+          <a:ln>
+            <a:solidFill>
+              <a:srgbClr val="FF0000"/>
+            </a:solidFill>
+            <a:headEnd type="triangle" w="med" len="med"/>
+            <a:tailEnd type="triangle" w="med" len="med"/>
+          </a:ln>
+        </p:spPr>
+        <p:style>
+          <a:lnRef idx="1">
+            <a:schemeClr val="accent1"/>
+          </a:lnRef>
+          <a:fillRef idx="0">
+            <a:schemeClr val="accent1"/>
+          </a:fillRef>
+          <a:effectRef idx="0">
+            <a:schemeClr val="accent1"/>
+          </a:effectRef>
+          <a:fontRef idx="minor">
+            <a:schemeClr val="tx1"/>
+          </a:fontRef>
+        </p:style>
+      </p:cxnSp>
+      <p:sp>
+        <p:nvSpPr>
+          <p:cNvPr id="39" name="직사각형 38"/>
+          <p:cNvSpPr/>
+          <p:nvPr/>
+        </p:nvSpPr>
+        <p:spPr>
+          <a:xfrm>
+            <a:off x="332087" y="3754156"/>
+            <a:ext cx="4312907" cy="253736"/>
+          </a:xfrm>
+          <a:prstGeom prst="rect">
+            <a:avLst/>
+          </a:prstGeom>
+        </p:spPr>
+        <p:txBody>
+          <a:bodyPr wrap="square">
+            <a:spAutoFit/>
+          </a:bodyPr>
+          <a:lstStyle/>
+          <a:p>
+            <a:r>
+              <a:rPr lang="en-US" altLang="ko-KR" sz="1000" b="1" dirty="0">
+                <a:latin typeface="+mn-ea"/>
+              </a:rPr>
+              <a:t>* </a:t>
+            </a:r>
+            <a:r>
+              <a:rPr lang="ko-KR" altLang="en-US" sz="1000" b="1" dirty="0" smtClean="0">
+                <a:latin typeface="+mn-ea"/>
+              </a:rPr>
+              <a:t>로그인</a:t>
+            </a:r>
+            <a:r>
+              <a:rPr lang="ko-KR" altLang="en-US" sz="1000" b="1" dirty="0" smtClean="0">
+                <a:latin typeface="+mn-ea"/>
+              </a:rPr>
+              <a:t> </a:t>
+            </a:r>
+            <a:r>
+              <a:rPr lang="en-US" altLang="ko-KR" sz="1000" b="1" dirty="0" smtClean="0">
+                <a:latin typeface="+mn-ea"/>
+              </a:rPr>
+              <a:t>&gt; </a:t>
+            </a:r>
+            <a:r>
+              <a:rPr lang="ko-KR" altLang="en-US" sz="1000" b="1" dirty="0" err="1" smtClean="0">
+                <a:latin typeface="+mn-ea"/>
+              </a:rPr>
+              <a:t>입력양식에</a:t>
+            </a:r>
+            <a:r>
+              <a:rPr lang="ko-KR" altLang="en-US" sz="1000" b="1" dirty="0" smtClean="0">
+                <a:latin typeface="+mn-ea"/>
+              </a:rPr>
+              <a:t> 대한 </a:t>
+            </a:r>
+            <a:r>
+              <a:rPr lang="ko-KR" altLang="en-US" sz="1000" b="1" dirty="0" err="1" smtClean="0">
+                <a:latin typeface="+mn-ea"/>
+              </a:rPr>
+              <a:t>콤포넌트</a:t>
+            </a:r>
+            <a:r>
+              <a:rPr lang="ko-KR" altLang="en-US" sz="1000" b="1" dirty="0" smtClean="0">
+                <a:latin typeface="+mn-ea"/>
+              </a:rPr>
+              <a:t> 설계서</a:t>
+            </a:r>
+            <a:endParaRPr lang="ko-KR" altLang="en-US" sz="1000" b="1" dirty="0">
+              <a:latin typeface="+mn-ea"/>
+            </a:endParaRPr>
+          </a:p>
+        </p:txBody>
+      </p:sp>
     </p:spTree>
     <p:extLst>
       <p:ext uri="{BB962C8B-B14F-4D97-AF65-F5344CB8AC3E}">

</xml_diff>